<commit_message>
Added new files and visualizations
</commit_message>
<xml_diff>
--- a/ressources/Wine.pptx
+++ b/ressources/Wine.pptx
@@ -8,7 +8,7 @@
     <p:sldId id="256" r:id="rId2"/>
     <p:sldId id="257" r:id="rId3"/>
     <p:sldId id="259" r:id="rId4"/>
-    <p:sldId id="260" r:id="rId5"/>
+    <p:sldId id="261" r:id="rId5"/>
     <p:sldId id="258" r:id="rId6"/>
   </p:sldIdLst>
   <p:sldSz cx="12192000" cy="6858000"/>
@@ -276,7 +276,7 @@
           <a:p>
             <a:fld id="{0167E7D7-8683-F948-8AE3-E6E4D0C4644B}" type="datetimeFigureOut">
               <a:rPr lang="en-DE" smtClean="0"/>
-              <a:t>18.11.23</a:t>
+              <a:t>19.11.23</a:t>
             </a:fld>
             <a:endParaRPr lang="en-DE"/>
           </a:p>
@@ -476,7 +476,7 @@
           <a:p>
             <a:fld id="{0167E7D7-8683-F948-8AE3-E6E4D0C4644B}" type="datetimeFigureOut">
               <a:rPr lang="en-DE" smtClean="0"/>
-              <a:t>18.11.23</a:t>
+              <a:t>19.11.23</a:t>
             </a:fld>
             <a:endParaRPr lang="en-DE"/>
           </a:p>
@@ -686,7 +686,7 @@
           <a:p>
             <a:fld id="{0167E7D7-8683-F948-8AE3-E6E4D0C4644B}" type="datetimeFigureOut">
               <a:rPr lang="en-DE" smtClean="0"/>
-              <a:t>18.11.23</a:t>
+              <a:t>19.11.23</a:t>
             </a:fld>
             <a:endParaRPr lang="en-DE"/>
           </a:p>
@@ -886,7 +886,7 @@
           <a:p>
             <a:fld id="{0167E7D7-8683-F948-8AE3-E6E4D0C4644B}" type="datetimeFigureOut">
               <a:rPr lang="en-DE" smtClean="0"/>
-              <a:t>18.11.23</a:t>
+              <a:t>19.11.23</a:t>
             </a:fld>
             <a:endParaRPr lang="en-DE"/>
           </a:p>
@@ -1162,7 +1162,7 @@
           <a:p>
             <a:fld id="{0167E7D7-8683-F948-8AE3-E6E4D0C4644B}" type="datetimeFigureOut">
               <a:rPr lang="en-DE" smtClean="0"/>
-              <a:t>18.11.23</a:t>
+              <a:t>19.11.23</a:t>
             </a:fld>
             <a:endParaRPr lang="en-DE"/>
           </a:p>
@@ -1430,7 +1430,7 @@
           <a:p>
             <a:fld id="{0167E7D7-8683-F948-8AE3-E6E4D0C4644B}" type="datetimeFigureOut">
               <a:rPr lang="en-DE" smtClean="0"/>
-              <a:t>18.11.23</a:t>
+              <a:t>19.11.23</a:t>
             </a:fld>
             <a:endParaRPr lang="en-DE"/>
           </a:p>
@@ -1845,7 +1845,7 @@
           <a:p>
             <a:fld id="{0167E7D7-8683-F948-8AE3-E6E4D0C4644B}" type="datetimeFigureOut">
               <a:rPr lang="en-DE" smtClean="0"/>
-              <a:t>18.11.23</a:t>
+              <a:t>19.11.23</a:t>
             </a:fld>
             <a:endParaRPr lang="en-DE"/>
           </a:p>
@@ -1987,7 +1987,7 @@
           <a:p>
             <a:fld id="{0167E7D7-8683-F948-8AE3-E6E4D0C4644B}" type="datetimeFigureOut">
               <a:rPr lang="en-DE" smtClean="0"/>
-              <a:t>18.11.23</a:t>
+              <a:t>19.11.23</a:t>
             </a:fld>
             <a:endParaRPr lang="en-DE"/>
           </a:p>
@@ -2100,7 +2100,7 @@
           <a:p>
             <a:fld id="{0167E7D7-8683-F948-8AE3-E6E4D0C4644B}" type="datetimeFigureOut">
               <a:rPr lang="en-DE" smtClean="0"/>
-              <a:t>18.11.23</a:t>
+              <a:t>19.11.23</a:t>
             </a:fld>
             <a:endParaRPr lang="en-DE"/>
           </a:p>
@@ -2413,7 +2413,7 @@
           <a:p>
             <a:fld id="{0167E7D7-8683-F948-8AE3-E6E4D0C4644B}" type="datetimeFigureOut">
               <a:rPr lang="en-DE" smtClean="0"/>
-              <a:t>18.11.23</a:t>
+              <a:t>19.11.23</a:t>
             </a:fld>
             <a:endParaRPr lang="en-DE"/>
           </a:p>
@@ -2702,7 +2702,7 @@
           <a:p>
             <a:fld id="{0167E7D7-8683-F948-8AE3-E6E4D0C4644B}" type="datetimeFigureOut">
               <a:rPr lang="en-DE" smtClean="0"/>
-              <a:t>18.11.23</a:t>
+              <a:t>19.11.23</a:t>
             </a:fld>
             <a:endParaRPr lang="en-DE"/>
           </a:p>
@@ -2945,7 +2945,7 @@
           <a:p>
             <a:fld id="{0167E7D7-8683-F948-8AE3-E6E4D0C4644B}" type="datetimeFigureOut">
               <a:rPr lang="en-DE" smtClean="0"/>
-              <a:t>18.11.23</a:t>
+              <a:t>19.11.23</a:t>
             </a:fld>
             <a:endParaRPr lang="en-DE"/>
           </a:p>
@@ -7739,10 +7739,10 @@
       </p:grpSpPr>
       <p:grpSp>
         <p:nvGrpSpPr>
-          <p:cNvPr id="1046" name="Group 1045">
+          <p:cNvPr id="23" name="Group 22">
             <a:extLst>
               <a:ext uri="{FF2B5EF4-FFF2-40B4-BE49-F238E27FC236}">
-                <a16:creationId xmlns:a16="http://schemas.microsoft.com/office/drawing/2014/main" id="{7ACB80DE-BC01-4CBF-BD4D-730B4B57F5CC}"/>
+                <a16:creationId xmlns:a16="http://schemas.microsoft.com/office/drawing/2014/main" id="{8A848FD6-866C-4C80-CA94-D4215434AC89}"/>
               </a:ext>
             </a:extLst>
           </p:cNvPr>
@@ -7751,12 +7751,262 @@
         </p:nvGrpSpPr>
         <p:grpSpPr>
           <a:xfrm>
-            <a:off x="174765" y="-22860"/>
-            <a:ext cx="11570614" cy="6769424"/>
-            <a:chOff x="174765" y="-22860"/>
-            <a:chExt cx="11570614" cy="6769424"/>
+            <a:off x="-119921" y="-284486"/>
+            <a:ext cx="13515882" cy="7270229"/>
+            <a:chOff x="-119921" y="-284486"/>
+            <a:chExt cx="13515882" cy="7270229"/>
           </a:xfrm>
         </p:grpSpPr>
+        <p:sp>
+          <p:nvSpPr>
+            <p:cNvPr id="5" name="Rectangle 4">
+              <a:extLst>
+                <a:ext uri="{FF2B5EF4-FFF2-40B4-BE49-F238E27FC236}">
+                  <a16:creationId xmlns:a16="http://schemas.microsoft.com/office/drawing/2014/main" id="{36BD7AAE-CBFE-5A00-C638-FED23ACA0A71}"/>
+                </a:ext>
+              </a:extLst>
+            </p:cNvPr>
+            <p:cNvSpPr/>
+            <p:nvPr/>
+          </p:nvSpPr>
+          <p:spPr>
+            <a:xfrm>
+              <a:off x="-119921" y="-284486"/>
+              <a:ext cx="13515882" cy="7270229"/>
+            </a:xfrm>
+            <a:prstGeom prst="rect">
+              <a:avLst/>
+            </a:prstGeom>
+            <a:solidFill>
+              <a:schemeClr val="bg1"/>
+            </a:solidFill>
+            <a:ln>
+              <a:noFill/>
+            </a:ln>
+          </p:spPr>
+          <p:style>
+            <a:lnRef idx="2">
+              <a:schemeClr val="accent1">
+                <a:shade val="15000"/>
+              </a:schemeClr>
+            </a:lnRef>
+            <a:fillRef idx="1">
+              <a:schemeClr val="accent1"/>
+            </a:fillRef>
+            <a:effectRef idx="0">
+              <a:schemeClr val="accent1"/>
+            </a:effectRef>
+            <a:fontRef idx="minor">
+              <a:schemeClr val="lt1"/>
+            </a:fontRef>
+          </p:style>
+          <p:txBody>
+            <a:bodyPr rtlCol="0" anchor="ctr"/>
+            <a:lstStyle/>
+            <a:p>
+              <a:pPr algn="ctr"/>
+              <a:endParaRPr lang="en-DE"/>
+            </a:p>
+          </p:txBody>
+        </p:sp>
+        <p:sp>
+          <p:nvSpPr>
+            <p:cNvPr id="11" name="Rounded Rectangle 10">
+              <a:extLst>
+                <a:ext uri="{FF2B5EF4-FFF2-40B4-BE49-F238E27FC236}">
+                  <a16:creationId xmlns:a16="http://schemas.microsoft.com/office/drawing/2014/main" id="{878BA0E4-905C-2AFF-943E-FDBF797E6607}"/>
+                </a:ext>
+              </a:extLst>
+            </p:cNvPr>
+            <p:cNvSpPr/>
+            <p:nvPr/>
+          </p:nvSpPr>
+          <p:spPr>
+            <a:xfrm>
+              <a:off x="1919995" y="-184680"/>
+              <a:ext cx="9606882" cy="7042680"/>
+            </a:xfrm>
+            <a:prstGeom prst="roundRect">
+              <a:avLst>
+                <a:gd name="adj" fmla="val 1778"/>
+              </a:avLst>
+            </a:prstGeom>
+            <a:solidFill>
+              <a:schemeClr val="accent2">
+                <a:lumMod val="20000"/>
+                <a:lumOff val="80000"/>
+              </a:schemeClr>
+            </a:solidFill>
+            <a:ln>
+              <a:solidFill>
+                <a:schemeClr val="accent2"/>
+              </a:solidFill>
+            </a:ln>
+          </p:spPr>
+          <p:style>
+            <a:lnRef idx="2">
+              <a:schemeClr val="accent1">
+                <a:shade val="15000"/>
+              </a:schemeClr>
+            </a:lnRef>
+            <a:fillRef idx="1">
+              <a:schemeClr val="accent1"/>
+            </a:fillRef>
+            <a:effectRef idx="0">
+              <a:schemeClr val="accent1"/>
+            </a:effectRef>
+            <a:fontRef idx="minor">
+              <a:schemeClr val="lt1"/>
+            </a:fontRef>
+          </p:style>
+          <p:txBody>
+            <a:bodyPr rtlCol="0" anchor="t"/>
+            <a:lstStyle/>
+            <a:p>
+              <a:pPr algn="ctr"/>
+              <a:r>
+                <a:rPr lang="en-DE" sz="2000" dirty="0">
+                  <a:solidFill>
+                    <a:schemeClr val="accent2"/>
+                  </a:solidFill>
+                </a:rPr>
+                <a:t>Wrangling</a:t>
+              </a:r>
+            </a:p>
+          </p:txBody>
+        </p:sp>
+        <p:sp>
+          <p:nvSpPr>
+            <p:cNvPr id="8" name="Rounded Rectangle 7">
+              <a:extLst>
+                <a:ext uri="{FF2B5EF4-FFF2-40B4-BE49-F238E27FC236}">
+                  <a16:creationId xmlns:a16="http://schemas.microsoft.com/office/drawing/2014/main" id="{4E60F7B1-E5CA-156A-87ED-B7ECBE3113F7}"/>
+                </a:ext>
+              </a:extLst>
+            </p:cNvPr>
+            <p:cNvSpPr/>
+            <p:nvPr/>
+          </p:nvSpPr>
+          <p:spPr>
+            <a:xfrm>
+              <a:off x="11710465" y="-184680"/>
+              <a:ext cx="1485300" cy="7042680"/>
+            </a:xfrm>
+            <a:prstGeom prst="roundRect">
+              <a:avLst>
+                <a:gd name="adj" fmla="val 6294"/>
+              </a:avLst>
+            </a:prstGeom>
+            <a:solidFill>
+              <a:schemeClr val="accent6">
+                <a:lumMod val="20000"/>
+                <a:lumOff val="80000"/>
+              </a:schemeClr>
+            </a:solidFill>
+            <a:ln>
+              <a:solidFill>
+                <a:schemeClr val="accent6"/>
+              </a:solidFill>
+            </a:ln>
+          </p:spPr>
+          <p:style>
+            <a:lnRef idx="2">
+              <a:schemeClr val="accent1">
+                <a:shade val="15000"/>
+              </a:schemeClr>
+            </a:lnRef>
+            <a:fillRef idx="1">
+              <a:schemeClr val="accent1"/>
+            </a:fillRef>
+            <a:effectRef idx="0">
+              <a:schemeClr val="accent1"/>
+            </a:effectRef>
+            <a:fontRef idx="minor">
+              <a:schemeClr val="lt1"/>
+            </a:fontRef>
+          </p:style>
+          <p:txBody>
+            <a:bodyPr rtlCol="0" anchor="t"/>
+            <a:lstStyle/>
+            <a:p>
+              <a:pPr algn="ctr"/>
+              <a:r>
+                <a:rPr lang="en-DE" sz="2000" dirty="0">
+                  <a:solidFill>
+                    <a:schemeClr val="accent6"/>
+                  </a:solidFill>
+                </a:rPr>
+                <a:t>Production</a:t>
+              </a:r>
+            </a:p>
+          </p:txBody>
+        </p:sp>
+        <p:sp>
+          <p:nvSpPr>
+            <p:cNvPr id="7" name="Rounded Rectangle 6">
+              <a:extLst>
+                <a:ext uri="{FF2B5EF4-FFF2-40B4-BE49-F238E27FC236}">
+                  <a16:creationId xmlns:a16="http://schemas.microsoft.com/office/drawing/2014/main" id="{4B4899B1-7BBE-A9EF-401D-A96697331795}"/>
+                </a:ext>
+              </a:extLst>
+            </p:cNvPr>
+            <p:cNvSpPr/>
+            <p:nvPr/>
+          </p:nvSpPr>
+          <p:spPr>
+            <a:xfrm>
+              <a:off x="11682" y="-184680"/>
+              <a:ext cx="1724725" cy="7042680"/>
+            </a:xfrm>
+            <a:prstGeom prst="roundRect">
+              <a:avLst>
+                <a:gd name="adj" fmla="val 6294"/>
+              </a:avLst>
+            </a:prstGeom>
+            <a:solidFill>
+              <a:schemeClr val="accent1">
+                <a:lumMod val="20000"/>
+                <a:lumOff val="80000"/>
+              </a:schemeClr>
+            </a:solidFill>
+            <a:ln>
+              <a:solidFill>
+                <a:schemeClr val="accent1"/>
+              </a:solidFill>
+            </a:ln>
+          </p:spPr>
+          <p:style>
+            <a:lnRef idx="2">
+              <a:schemeClr val="accent1">
+                <a:shade val="15000"/>
+              </a:schemeClr>
+            </a:lnRef>
+            <a:fillRef idx="1">
+              <a:schemeClr val="accent1"/>
+            </a:fillRef>
+            <a:effectRef idx="0">
+              <a:schemeClr val="accent1"/>
+            </a:effectRef>
+            <a:fontRef idx="minor">
+              <a:schemeClr val="lt1"/>
+            </a:fontRef>
+          </p:style>
+          <p:txBody>
+            <a:bodyPr rtlCol="0" anchor="t"/>
+            <a:lstStyle/>
+            <a:p>
+              <a:pPr algn="ctr"/>
+              <a:r>
+                <a:rPr lang="en-DE" sz="2000" dirty="0">
+                  <a:solidFill>
+                    <a:schemeClr val="accent1"/>
+                  </a:solidFill>
+                </a:rPr>
+                <a:t>Ingestion</a:t>
+              </a:r>
+            </a:p>
+          </p:txBody>
+        </p:sp>
         <p:pic>
           <p:nvPicPr>
             <p:cNvPr id="149" name="Graphic 148" descr="Radar Chart with solid fill">
@@ -7785,7 +8035,7 @@
           </p:blipFill>
           <p:spPr>
             <a:xfrm>
-              <a:off x="512423" y="5748788"/>
+              <a:off x="605101" y="5748788"/>
               <a:ext cx="537886" cy="537886"/>
             </a:xfrm>
             <a:prstGeom prst="rect">
@@ -7897,6 +8147,16 @@
           </p:nvPicPr>
           <p:blipFill rotWithShape="1">
             <a:blip r:embed="rId4">
+              <a:clrChange>
+                <a:clrFrom>
+                  <a:srgbClr val="FFFFFF"/>
+                </a:clrFrom>
+                <a:clrTo>
+                  <a:srgbClr val="FFFFFF">
+                    <a:alpha val="0"/>
+                  </a:srgbClr>
+                </a:clrTo>
+              </a:clrChange>
               <a:extLst>
                 <a:ext uri="{28A0092B-C50C-407E-A947-70E740481C1C}">
                   <a14:useLocalDpi xmlns:a14="http://schemas.microsoft.com/office/drawing/2010/main" val="0"/>
@@ -8028,7 +8288,7 @@
           </p:nvGrpSpPr>
           <p:grpSpPr>
             <a:xfrm>
-              <a:off x="174765" y="787094"/>
+              <a:off x="273269" y="787094"/>
               <a:ext cx="1201550" cy="400809"/>
               <a:chOff x="903427" y="686965"/>
               <a:chExt cx="1430122" cy="477055"/>
@@ -8098,7 +8358,7 @@
             <p:spPr>
               <a:xfrm>
                 <a:off x="971092" y="739837"/>
-                <a:ext cx="1097449" cy="329693"/>
+                <a:ext cx="1315517" cy="329693"/>
               </a:xfrm>
               <a:prstGeom prst="rect">
                 <a:avLst/>
@@ -8106,11 +8366,12 @@
               <a:noFill/>
             </p:spPr>
             <p:txBody>
-              <a:bodyPr wrap="none" rtlCol="0">
+              <a:bodyPr wrap="square" rtlCol="0">
                 <a:spAutoFit/>
               </a:bodyPr>
               <a:lstStyle/>
               <a:p>
+                <a:pPr algn="ctr"/>
                 <a:r>
                   <a:rPr lang="en-DE" sz="1200" dirty="0">
                     <a:latin typeface="Avenir Book" panose="02000503020000020003" pitchFamily="2" charset="0"/>
@@ -8234,7 +8495,11 @@
             <a:prstGeom prst="roundRect">
               <a:avLst/>
             </a:prstGeom>
-            <a:noFill/>
+            <a:solidFill>
+              <a:srgbClr val="FFFFFF">
+                <a:alpha val="69804"/>
+              </a:srgbClr>
+            </a:solidFill>
             <a:ln>
               <a:solidFill>
                 <a:schemeClr val="accent2"/>
@@ -8269,7 +8534,7 @@
                   </a:solidFill>
                   <a:latin typeface="Avenir Book" panose="02000503020000020003" pitchFamily="2" charset="0"/>
                 </a:rPr>
-                <a:t>Scrape and save</a:t>
+                <a:t>Save Scraped data</a:t>
               </a:r>
             </a:p>
           </p:txBody>
@@ -8338,7 +8603,11 @@
             <a:prstGeom prst="roundRect">
               <a:avLst/>
             </a:prstGeom>
-            <a:noFill/>
+            <a:solidFill>
+              <a:srgbClr val="FFFFFF">
+                <a:alpha val="69804"/>
+              </a:srgbClr>
+            </a:solidFill>
             <a:ln>
               <a:solidFill>
                 <a:schemeClr val="accent2"/>
@@ -8378,51 +8647,6 @@
             </a:p>
           </p:txBody>
         </p:sp>
-        <p:pic>
-          <p:nvPicPr>
-            <p:cNvPr id="1032" name="Picture 8" descr="10 Reasons Why Neo4j Is the Best Graph Database for Your Project">
-              <a:extLst>
-                <a:ext uri="{FF2B5EF4-FFF2-40B4-BE49-F238E27FC236}">
-                  <a16:creationId xmlns:a16="http://schemas.microsoft.com/office/drawing/2014/main" id="{41B8B751-8FAA-0E5C-4367-CDA9D0E9F923}"/>
-                </a:ext>
-              </a:extLst>
-            </p:cNvPr>
-            <p:cNvPicPr>
-              <a:picLocks noChangeAspect="1" noChangeArrowheads="1"/>
-            </p:cNvPicPr>
-            <p:nvPr/>
-          </p:nvPicPr>
-          <p:blipFill rotWithShape="1">
-            <a:blip r:embed="rId6">
-              <a:extLst>
-                <a:ext uri="{28A0092B-C50C-407E-A947-70E740481C1C}">
-                  <a14:useLocalDpi xmlns:a14="http://schemas.microsoft.com/office/drawing/2010/main" val="0"/>
-                </a:ext>
-              </a:extLst>
-            </a:blip>
-            <a:srcRect l="12316" t="23509" r="25407" b="18397"/>
-            <a:stretch/>
-          </p:blipFill>
-          <p:spPr bwMode="auto">
-            <a:xfrm>
-              <a:off x="11160128" y="1134767"/>
-              <a:ext cx="362955" cy="338577"/>
-            </a:xfrm>
-            <a:prstGeom prst="rect">
-              <a:avLst/>
-            </a:prstGeom>
-            <a:noFill/>
-            <a:extLst>
-              <a:ext uri="{909E8E84-426E-40DD-AFC4-6F175D3DCCD1}">
-                <a14:hiddenFill xmlns:a14="http://schemas.microsoft.com/office/drawing/2010/main">
-                  <a:solidFill>
-                    <a:srgbClr val="FFFFFF"/>
-                  </a:solidFill>
-                </a14:hiddenFill>
-              </a:ext>
-            </a:extLst>
-          </p:spPr>
-        </p:pic>
         <p:sp>
           <p:nvSpPr>
             <p:cNvPr id="26" name="Rounded Rectangle 25">
@@ -8443,7 +8667,11 @@
             <a:prstGeom prst="roundRect">
               <a:avLst/>
             </a:prstGeom>
-            <a:noFill/>
+            <a:solidFill>
+              <a:srgbClr val="FFFFFF">
+                <a:alpha val="69804"/>
+              </a:srgbClr>
+            </a:solidFill>
             <a:ln>
               <a:solidFill>
                 <a:schemeClr val="accent2"/>
@@ -8472,13 +8700,22 @@
             <a:p>
               <a:pPr algn="ctr"/>
               <a:r>
+                <a:rPr lang="en-GB" sz="1200" dirty="0">
+                  <a:solidFill>
+                    <a:schemeClr val="accent2"/>
+                  </a:solidFill>
+                  <a:latin typeface="Avenir Book" panose="02000503020000020003" pitchFamily="2" charset="0"/>
+                </a:rPr>
+                <a:t>A</a:t>
+              </a:r>
+              <a:r>
                 <a:rPr lang="en-DE" sz="1200" dirty="0">
                   <a:solidFill>
                     <a:schemeClr val="accent2"/>
                   </a:solidFill>
                   <a:latin typeface="Avenir Book" panose="02000503020000020003" pitchFamily="2" charset="0"/>
                 </a:rPr>
-                <a:t>Final DB</a:t>
+                <a:t>ppend final DB</a:t>
               </a:r>
             </a:p>
           </p:txBody>
@@ -8498,7 +8735,7 @@
           <p:spPr>
             <a:xfrm>
               <a:off x="8394607" y="1304055"/>
-              <a:ext cx="2412000" cy="0"/>
+              <a:ext cx="3528000" cy="0"/>
             </a:xfrm>
             <a:prstGeom prst="straightConnector1">
               <a:avLst/>
@@ -8649,7 +8886,17 @@
             <p:nvPr/>
           </p:nvPicPr>
           <p:blipFill>
-            <a:blip r:embed="rId7">
+            <a:blip r:embed="rId6">
+              <a:clrChange>
+                <a:clrFrom>
+                  <a:srgbClr val="FFFFFF"/>
+                </a:clrFrom>
+                <a:clrTo>
+                  <a:srgbClr val="FFFFFF">
+                    <a:alpha val="0"/>
+                  </a:srgbClr>
+                </a:clrTo>
+              </a:clrChange>
               <a:extLst>
                 <a:ext uri="{28A0092B-C50C-407E-A947-70E740481C1C}">
                   <a14:useLocalDpi xmlns:a14="http://schemas.microsoft.com/office/drawing/2010/main" val="0"/>
@@ -8663,7 +8910,7 @@
           </p:blipFill>
           <p:spPr bwMode="auto">
             <a:xfrm>
-              <a:off x="11197490" y="500400"/>
+              <a:off x="11113516" y="500400"/>
               <a:ext cx="332708" cy="332709"/>
             </a:xfrm>
             <a:prstGeom prst="rect">
@@ -8701,7 +8948,11 @@
             <a:prstGeom prst="roundRect">
               <a:avLst/>
             </a:prstGeom>
-            <a:noFill/>
+            <a:solidFill>
+              <a:srgbClr val="FFFFFF">
+                <a:alpha val="69804"/>
+              </a:srgbClr>
+            </a:solidFill>
             <a:ln>
               <a:solidFill>
                 <a:schemeClr val="accent2"/>
@@ -8730,13 +8981,22 @@
             <a:p>
               <a:pPr algn="ctr"/>
               <a:r>
+                <a:rPr lang="en-GB" sz="1200" dirty="0">
+                  <a:solidFill>
+                    <a:schemeClr val="accent2"/>
+                  </a:solidFill>
+                  <a:latin typeface="Avenir Book" panose="02000503020000020003" pitchFamily="2" charset="0"/>
+                </a:rPr>
+                <a:t>A</a:t>
+              </a:r>
+              <a:r>
                 <a:rPr lang="en-DE" sz="1200" dirty="0">
                   <a:solidFill>
                     <a:schemeClr val="accent2"/>
                   </a:solidFill>
                   <a:latin typeface="Avenir Book" panose="02000503020000020003" pitchFamily="2" charset="0"/>
                 </a:rPr>
-                <a:t>Hashmap to check if exists</a:t>
+                <a:t>ppend hashmap to check if exists</a:t>
               </a:r>
             </a:p>
           </p:txBody>
@@ -8750,13 +9010,15 @@
                 </a:ext>
               </a:extLst>
             </p:cNvPr>
-            <p:cNvCxnSpPr/>
+            <p:cNvCxnSpPr>
+              <a:cxnSpLocks/>
+            </p:cNvCxnSpPr>
             <p:nvPr/>
           </p:nvCxnSpPr>
           <p:spPr>
             <a:xfrm>
               <a:off x="8394607" y="666754"/>
-              <a:ext cx="2412000" cy="0"/>
+              <a:ext cx="2619519" cy="0"/>
             </a:xfrm>
             <a:prstGeom prst="straightConnector1">
               <a:avLst/>
@@ -8888,7 +9150,7 @@
           </p:nvGrpSpPr>
           <p:grpSpPr>
             <a:xfrm>
-              <a:off x="174765" y="2474261"/>
+              <a:off x="273269" y="2474261"/>
               <a:ext cx="1201550" cy="472750"/>
               <a:chOff x="903427" y="601338"/>
               <a:chExt cx="1430122" cy="562682"/>
@@ -9107,7 +9369,9 @@
               <a:avLst/>
             </a:prstGeom>
             <a:solidFill>
-              <a:schemeClr val="bg1"/>
+              <a:srgbClr val="FFFFFF">
+                <a:alpha val="69804"/>
+              </a:srgbClr>
             </a:solidFill>
             <a:ln>
               <a:solidFill>
@@ -9168,7 +9432,11 @@
             <a:prstGeom prst="roundRect">
               <a:avLst/>
             </a:prstGeom>
-            <a:noFill/>
+            <a:solidFill>
+              <a:srgbClr val="FFFFFF">
+                <a:alpha val="69804"/>
+              </a:srgbClr>
+            </a:solidFill>
             <a:ln>
               <a:solidFill>
                 <a:schemeClr val="accent2"/>
@@ -9203,7 +9471,7 @@
                   </a:solidFill>
                   <a:latin typeface="Avenir Book" panose="02000503020000020003" pitchFamily="2" charset="0"/>
                 </a:rPr>
-                <a:t>Else: generate features and save </a:t>
+                <a:t>Else: append generated features</a:t>
               </a:r>
             </a:p>
           </p:txBody>
@@ -9223,7 +9491,7 @@
           <p:spPr>
             <a:xfrm>
               <a:off x="8370866" y="2691182"/>
-              <a:ext cx="2412000" cy="0"/>
+              <a:ext cx="3528000" cy="0"/>
             </a:xfrm>
             <a:prstGeom prst="straightConnector1">
               <a:avLst/>
@@ -9358,7 +9626,11 @@
             <a:prstGeom prst="roundRect">
               <a:avLst/>
             </a:prstGeom>
-            <a:noFill/>
+            <a:solidFill>
+              <a:srgbClr val="FFFFFF">
+                <a:alpha val="69804"/>
+              </a:srgbClr>
+            </a:solidFill>
             <a:ln>
               <a:solidFill>
                 <a:schemeClr val="accent2"/>
@@ -9400,51 +9672,6 @@
         </p:sp>
         <p:pic>
           <p:nvPicPr>
-            <p:cNvPr id="114" name="Picture 8" descr="10 Reasons Why Neo4j Is the Best Graph Database for Your Project">
-              <a:extLst>
-                <a:ext uri="{FF2B5EF4-FFF2-40B4-BE49-F238E27FC236}">
-                  <a16:creationId xmlns:a16="http://schemas.microsoft.com/office/drawing/2014/main" id="{EADF39D3-47B9-378A-114F-35AD602931B4}"/>
-                </a:ext>
-              </a:extLst>
-            </p:cNvPr>
-            <p:cNvPicPr>
-              <a:picLocks noChangeAspect="1" noChangeArrowheads="1"/>
-            </p:cNvPicPr>
-            <p:nvPr/>
-          </p:nvPicPr>
-          <p:blipFill rotWithShape="1">
-            <a:blip r:embed="rId6">
-              <a:extLst>
-                <a:ext uri="{28A0092B-C50C-407E-A947-70E740481C1C}">
-                  <a14:useLocalDpi xmlns:a14="http://schemas.microsoft.com/office/drawing/2010/main" val="0"/>
-                </a:ext>
-              </a:extLst>
-            </a:blip>
-            <a:srcRect l="12316" t="23509" r="25407" b="18397"/>
-            <a:stretch/>
-          </p:blipFill>
-          <p:spPr bwMode="auto">
-            <a:xfrm>
-              <a:off x="11160128" y="2521893"/>
-              <a:ext cx="362955" cy="338577"/>
-            </a:xfrm>
-            <a:prstGeom prst="rect">
-              <a:avLst/>
-            </a:prstGeom>
-            <a:noFill/>
-            <a:extLst>
-              <a:ext uri="{909E8E84-426E-40DD-AFC4-6F175D3DCCD1}">
-                <a14:hiddenFill xmlns:a14="http://schemas.microsoft.com/office/drawing/2010/main">
-                  <a:solidFill>
-                    <a:srgbClr val="FFFFFF"/>
-                  </a:solidFill>
-                </a14:hiddenFill>
-              </a:ext>
-            </a:extLst>
-          </p:spPr>
-        </p:pic>
-        <p:pic>
-          <p:nvPicPr>
             <p:cNvPr id="118" name="Graphic 117" descr="Rating Star with solid fill">
               <a:extLst>
                 <a:ext uri="{FF2B5EF4-FFF2-40B4-BE49-F238E27FC236}">
@@ -9458,10 +9685,10 @@
             <p:nvPr/>
           </p:nvPicPr>
           <p:blipFill>
-            <a:blip r:embed="rId8">
+            <a:blip r:embed="rId7">
               <a:extLst>
                 <a:ext uri="{96DAC541-7B7A-43D3-8B79-37D633B846F1}">
-                  <asvg:svgBlip xmlns:asvg="http://schemas.microsoft.com/office/drawing/2016/SVG/main" r:embed="rId9"/>
+                  <asvg:svgBlip xmlns:asvg="http://schemas.microsoft.com/office/drawing/2016/SVG/main" r:embed="rId8"/>
                 </a:ext>
               </a:extLst>
             </a:blip>
@@ -9471,7 +9698,7 @@
           </p:blipFill>
           <p:spPr>
             <a:xfrm>
-              <a:off x="472584" y="236873"/>
+              <a:off x="559263" y="236873"/>
               <a:ext cx="629563" cy="629563"/>
             </a:xfrm>
             <a:prstGeom prst="rect">
@@ -9493,7 +9720,7 @@
           </p:nvGrpSpPr>
           <p:grpSpPr>
             <a:xfrm>
-              <a:off x="571778" y="1926449"/>
+              <a:off x="679516" y="1926449"/>
               <a:ext cx="389056" cy="521781"/>
               <a:chOff x="6533338" y="1991514"/>
               <a:chExt cx="914401" cy="1226346"/>
@@ -9514,10 +9741,10 @@
               <p:nvPr/>
             </p:nvPicPr>
             <p:blipFill>
-              <a:blip r:embed="rId10">
+              <a:blip r:embed="rId9">
                 <a:extLst>
                   <a:ext uri="{96DAC541-7B7A-43D3-8B79-37D633B846F1}">
-                    <asvg:svgBlip xmlns:asvg="http://schemas.microsoft.com/office/drawing/2016/SVG/main" r:embed="rId11"/>
+                    <asvg:svgBlip xmlns:asvg="http://schemas.microsoft.com/office/drawing/2016/SVG/main" r:embed="rId10"/>
                   </a:ext>
                 </a:extLst>
               </a:blip>
@@ -9687,7 +9914,7 @@
                 </a:pathLst>
               </a:custGeom>
               <a:solidFill>
-                <a:schemeClr val="accent2"/>
+                <a:schemeClr val="tx1"/>
               </a:solidFill>
               <a:ln w="9525" cap="flat">
                 <a:noFill/>
@@ -9718,7 +9945,7 @@
           </p:nvGrpSpPr>
           <p:grpSpPr>
             <a:xfrm>
-              <a:off x="578661" y="3312258"/>
+              <a:off x="679516" y="3312258"/>
               <a:ext cx="389056" cy="554583"/>
               <a:chOff x="8625609" y="1914418"/>
               <a:chExt cx="914401" cy="1303442"/>
@@ -9739,10 +9966,10 @@
               <p:nvPr/>
             </p:nvPicPr>
             <p:blipFill>
-              <a:blip r:embed="rId10">
+              <a:blip r:embed="rId9">
                 <a:extLst>
                   <a:ext uri="{96DAC541-7B7A-43D3-8B79-37D633B846F1}">
-                    <asvg:svgBlip xmlns:asvg="http://schemas.microsoft.com/office/drawing/2016/SVG/main" r:embed="rId11"/>
+                    <asvg:svgBlip xmlns:asvg="http://schemas.microsoft.com/office/drawing/2016/SVG/main" r:embed="rId10"/>
                   </a:ext>
                 </a:extLst>
               </a:blip>
@@ -9775,10 +10002,10 @@
               <p:nvPr/>
             </p:nvPicPr>
             <p:blipFill>
-              <a:blip r:embed="rId12">
+              <a:blip r:embed="rId11">
                 <a:extLst>
                   <a:ext uri="{96DAC541-7B7A-43D3-8B79-37D633B846F1}">
-                    <asvg:svgBlip xmlns:asvg="http://schemas.microsoft.com/office/drawing/2016/SVG/main" r:embed="rId13"/>
+                    <asvg:svgBlip xmlns:asvg="http://schemas.microsoft.com/office/drawing/2016/SVG/main" r:embed="rId12"/>
                   </a:ext>
                 </a:extLst>
               </a:blip>
@@ -9811,7 +10038,7 @@
           </p:nvGrpSpPr>
           <p:grpSpPr>
             <a:xfrm>
-              <a:off x="174765" y="3856248"/>
+              <a:off x="273269" y="3856248"/>
               <a:ext cx="1201550" cy="472750"/>
               <a:chOff x="903427" y="601338"/>
               <a:chExt cx="1430122" cy="562682"/>
@@ -10030,7 +10257,9 @@
               <a:avLst/>
             </a:prstGeom>
             <a:solidFill>
-              <a:schemeClr val="bg1"/>
+              <a:srgbClr val="FFFFFF">
+                <a:alpha val="69804"/>
+              </a:srgbClr>
             </a:solidFill>
             <a:ln>
               <a:solidFill>
@@ -10091,7 +10320,11 @@
             <a:prstGeom prst="roundRect">
               <a:avLst/>
             </a:prstGeom>
-            <a:noFill/>
+            <a:solidFill>
+              <a:srgbClr val="FFFFFF">
+                <a:alpha val="69804"/>
+              </a:srgbClr>
+            </a:solidFill>
             <a:ln>
               <a:solidFill>
                 <a:schemeClr val="accent2"/>
@@ -10126,7 +10359,7 @@
                   </a:solidFill>
                   <a:latin typeface="Avenir Book" panose="02000503020000020003" pitchFamily="2" charset="0"/>
                 </a:rPr>
-                <a:t>Else: generate features and save </a:t>
+                <a:t>Else: append generated features</a:t>
               </a:r>
             </a:p>
           </p:txBody>
@@ -10147,8 +10380,8 @@
           </p:nvCxnSpPr>
           <p:spPr>
             <a:xfrm>
-              <a:off x="10662407" y="5864854"/>
-              <a:ext cx="457613" cy="0"/>
+              <a:off x="10618783" y="5864854"/>
+              <a:ext cx="395343" cy="0"/>
             </a:xfrm>
             <a:prstGeom prst="straightConnector1">
               <a:avLst/>
@@ -10283,7 +10516,11 @@
             <a:prstGeom prst="roundRect">
               <a:avLst/>
             </a:prstGeom>
-            <a:noFill/>
+            <a:solidFill>
+              <a:srgbClr val="FFFFFF">
+                <a:alpha val="69804"/>
+              </a:srgbClr>
+            </a:solidFill>
             <a:ln>
               <a:solidFill>
                 <a:schemeClr val="accent2"/>
@@ -10323,51 +10560,6 @@
             </a:p>
           </p:txBody>
         </p:sp>
-        <p:pic>
-          <p:nvPicPr>
-            <p:cNvPr id="167" name="Picture 8" descr="10 Reasons Why Neo4j Is the Best Graph Database for Your Project">
-              <a:extLst>
-                <a:ext uri="{FF2B5EF4-FFF2-40B4-BE49-F238E27FC236}">
-                  <a16:creationId xmlns:a16="http://schemas.microsoft.com/office/drawing/2014/main" id="{B9012729-DBAF-52AD-03A1-0DC68F1913C9}"/>
-                </a:ext>
-              </a:extLst>
-            </p:cNvPr>
-            <p:cNvPicPr>
-              <a:picLocks noChangeAspect="1" noChangeArrowheads="1"/>
-            </p:cNvPicPr>
-            <p:nvPr/>
-          </p:nvPicPr>
-          <p:blipFill rotWithShape="1">
-            <a:blip r:embed="rId6">
-              <a:extLst>
-                <a:ext uri="{28A0092B-C50C-407E-A947-70E740481C1C}">
-                  <a14:useLocalDpi xmlns:a14="http://schemas.microsoft.com/office/drawing/2010/main" val="0"/>
-                </a:ext>
-              </a:extLst>
-            </a:blip>
-            <a:srcRect l="12316" t="23509" r="25407" b="18397"/>
-            <a:stretch/>
-          </p:blipFill>
-          <p:spPr bwMode="auto">
-            <a:xfrm>
-              <a:off x="11160128" y="3903880"/>
-              <a:ext cx="362955" cy="338577"/>
-            </a:xfrm>
-            <a:prstGeom prst="rect">
-              <a:avLst/>
-            </a:prstGeom>
-            <a:noFill/>
-            <a:extLst>
-              <a:ext uri="{909E8E84-426E-40DD-AFC4-6F175D3DCCD1}">
-                <a14:hiddenFill xmlns:a14="http://schemas.microsoft.com/office/drawing/2010/main">
-                  <a:solidFill>
-                    <a:srgbClr val="FFFFFF"/>
-                  </a:solidFill>
-                </a14:hiddenFill>
-              </a:ext>
-            </a:extLst>
-          </p:spPr>
-        </p:pic>
         <p:grpSp>
           <p:nvGrpSpPr>
             <p:cNvPr id="182" name="Group 181">
@@ -10382,7 +10574,7 @@
           </p:nvGrpSpPr>
           <p:grpSpPr>
             <a:xfrm>
-              <a:off x="174765" y="6273814"/>
+              <a:off x="273269" y="6273814"/>
               <a:ext cx="1201550" cy="472750"/>
               <a:chOff x="903427" y="601338"/>
               <a:chExt cx="1430122" cy="562682"/>
@@ -10600,7 +10792,11 @@
             <a:prstGeom prst="roundRect">
               <a:avLst/>
             </a:prstGeom>
-            <a:noFill/>
+            <a:solidFill>
+              <a:srgbClr val="FFFFFF">
+                <a:alpha val="69804"/>
+              </a:srgbClr>
+            </a:solidFill>
             <a:ln>
               <a:solidFill>
                 <a:schemeClr val="accent2"/>
@@ -10669,7 +10865,7 @@
           </p:blipFill>
           <p:spPr bwMode="auto">
             <a:xfrm>
-              <a:off x="11160127" y="6323037"/>
+              <a:off x="12243032" y="6323037"/>
               <a:ext cx="362955" cy="374305"/>
             </a:xfrm>
             <a:prstGeom prst="rect">
@@ -10701,16 +10897,20 @@
           </p:nvSpPr>
           <p:spPr>
             <a:xfrm>
-              <a:off x="10984601" y="934419"/>
+              <a:off x="12067506" y="934419"/>
               <a:ext cx="760778" cy="4613241"/>
             </a:xfrm>
             <a:prstGeom prst="roundRect">
               <a:avLst/>
             </a:prstGeom>
-            <a:noFill/>
+            <a:solidFill>
+              <a:srgbClr val="FFFFFF">
+                <a:alpha val="69804"/>
+              </a:srgbClr>
+            </a:solidFill>
             <a:ln>
               <a:solidFill>
-                <a:schemeClr val="accent5"/>
+                <a:schemeClr val="accent6"/>
               </a:solidFill>
             </a:ln>
           </p:spPr>
@@ -10760,7 +10960,7 @@
           </p:nvGrpSpPr>
           <p:grpSpPr>
             <a:xfrm>
-              <a:off x="174765" y="5103897"/>
+              <a:off x="273269" y="5103897"/>
               <a:ext cx="1201550" cy="472750"/>
               <a:chOff x="903427" y="601338"/>
               <a:chExt cx="1430122" cy="562682"/>
@@ -10979,7 +11179,9 @@
               <a:avLst/>
             </a:prstGeom>
             <a:solidFill>
-              <a:schemeClr val="bg1"/>
+              <a:srgbClr val="FFFFFF">
+                <a:alpha val="69804"/>
+              </a:srgbClr>
             </a:solidFill>
             <a:ln>
               <a:solidFill>
@@ -11040,7 +11242,11 @@
             <a:prstGeom prst="roundRect">
               <a:avLst/>
             </a:prstGeom>
-            <a:noFill/>
+            <a:solidFill>
+              <a:srgbClr val="FFFFFF">
+                <a:alpha val="69804"/>
+              </a:srgbClr>
+            </a:solidFill>
             <a:ln>
               <a:solidFill>
                 <a:schemeClr val="accent2"/>
@@ -11075,7 +11281,7 @@
                   </a:solidFill>
                   <a:latin typeface="Avenir Book" panose="02000503020000020003" pitchFamily="2" charset="0"/>
                 </a:rPr>
-                <a:t>Else: generate features and save </a:t>
+                <a:t>Else: append generated features</a:t>
               </a:r>
             </a:p>
           </p:txBody>
@@ -11188,7 +11394,11 @@
             <a:prstGeom prst="roundRect">
               <a:avLst/>
             </a:prstGeom>
-            <a:noFill/>
+            <a:solidFill>
+              <a:srgbClr val="FFFFFF">
+                <a:alpha val="69804"/>
+              </a:srgbClr>
+            </a:solidFill>
             <a:ln>
               <a:solidFill>
                 <a:schemeClr val="accent2"/>
@@ -11243,7 +11453,7 @@
             <p:nvPr/>
           </p:nvPicPr>
           <p:blipFill rotWithShape="1">
-            <a:blip r:embed="rId6">
+            <a:blip r:embed="rId13">
               <a:extLst>
                 <a:ext uri="{28A0092B-C50C-407E-A947-70E740481C1C}">
                   <a14:useLocalDpi xmlns:a14="http://schemas.microsoft.com/office/drawing/2010/main" val="0"/>
@@ -11255,7 +11465,7 @@
           </p:blipFill>
           <p:spPr bwMode="auto">
             <a:xfrm>
-              <a:off x="11160128" y="5141788"/>
+              <a:off x="12243033" y="5141788"/>
               <a:ext cx="362955" cy="338577"/>
             </a:xfrm>
             <a:prstGeom prst="rect">
@@ -11287,7 +11497,7 @@
           </p:nvGrpSpPr>
           <p:grpSpPr>
             <a:xfrm>
-              <a:off x="562525" y="4721886"/>
+              <a:off x="677480" y="4721886"/>
               <a:ext cx="393129" cy="466523"/>
               <a:chOff x="5638800" y="2789727"/>
               <a:chExt cx="923974" cy="1096473"/>
@@ -12013,13 +12223,17 @@
           </p:nvSpPr>
           <p:spPr>
             <a:xfrm>
-              <a:off x="8993465" y="5533616"/>
+              <a:off x="8993465" y="5648133"/>
               <a:ext cx="1562801" cy="453692"/>
             </a:xfrm>
             <a:prstGeom prst="roundRect">
               <a:avLst/>
             </a:prstGeom>
-            <a:noFill/>
+            <a:solidFill>
+              <a:srgbClr val="FFFFFF">
+                <a:alpha val="69804"/>
+              </a:srgbClr>
+            </a:solidFill>
             <a:ln>
               <a:solidFill>
                 <a:schemeClr val="accent2"/>
@@ -12054,7 +12268,25 @@
                   </a:solidFill>
                   <a:latin typeface="Avenir Book" panose="02000503020000020003" pitchFamily="2" charset="0"/>
                 </a:rPr>
-                <a:t>If NaN: Log Region for cleaning</a:t>
+                <a:t>If NaN: Log </a:t>
+              </a:r>
+              <a:r>
+                <a:rPr lang="en-DE" sz="1200" i="1" dirty="0">
+                  <a:solidFill>
+                    <a:schemeClr val="accent2"/>
+                  </a:solidFill>
+                  <a:latin typeface="Avenir Book" panose="02000503020000020003" pitchFamily="2" charset="0"/>
+                </a:rPr>
+                <a:t>Region</a:t>
+              </a:r>
+              <a:r>
+                <a:rPr lang="en-DE" sz="1200" dirty="0">
+                  <a:solidFill>
+                    <a:schemeClr val="accent2"/>
+                  </a:solidFill>
+                  <a:latin typeface="Avenir Book" panose="02000503020000020003" pitchFamily="2" charset="0"/>
+                </a:rPr>
+                <a:t> for cleaning</a:t>
               </a:r>
             </a:p>
           </p:txBody>
@@ -12074,7 +12306,7 @@
           <p:spPr>
             <a:xfrm>
               <a:off x="8370866" y="6510189"/>
-              <a:ext cx="2412000" cy="0"/>
+              <a:ext cx="3528000" cy="0"/>
             </a:xfrm>
             <a:prstGeom prst="straightConnector1">
               <a:avLst/>
@@ -12130,7 +12362,7 @@
           </p:blipFill>
           <p:spPr bwMode="auto">
             <a:xfrm>
-              <a:off x="11160127" y="5674467"/>
+              <a:off x="11071646" y="5674467"/>
               <a:ext cx="394898" cy="394898"/>
             </a:xfrm>
             <a:prstGeom prst="rect">
@@ -12163,7 +12395,7 @@
           <p:spPr>
             <a:xfrm>
               <a:off x="8370866" y="4084553"/>
-              <a:ext cx="2412000" cy="0"/>
+              <a:ext cx="3528000" cy="0"/>
             </a:xfrm>
             <a:prstGeom prst="straightConnector1">
               <a:avLst/>
@@ -12199,13 +12431,15 @@
                 </a:ext>
               </a:extLst>
             </p:cNvPr>
-            <p:cNvCxnSpPr/>
+            <p:cNvCxnSpPr>
+              <a:cxnSpLocks/>
+            </p:cNvCxnSpPr>
             <p:nvPr/>
           </p:nvCxnSpPr>
           <p:spPr>
             <a:xfrm>
               <a:off x="8370866" y="5318267"/>
-              <a:ext cx="2412000" cy="0"/>
+              <a:ext cx="3528000" cy="0"/>
             </a:xfrm>
             <a:prstGeom prst="straightConnector1">
               <a:avLst/>
@@ -12232,86 +12466,146 @@
             </a:fontRef>
           </p:style>
         </p:cxnSp>
-        <p:sp>
-          <p:nvSpPr>
-            <p:cNvPr id="1044" name="TextBox 1043">
+        <p:pic>
+          <p:nvPicPr>
+            <p:cNvPr id="1032" name="Picture 8" descr="10 Reasons Why Neo4j Is the Best Graph Database for Your Project">
               <a:extLst>
                 <a:ext uri="{FF2B5EF4-FFF2-40B4-BE49-F238E27FC236}">
-                  <a16:creationId xmlns:a16="http://schemas.microsoft.com/office/drawing/2014/main" id="{A37BC29C-7C22-139F-FB0C-EF4663EDD15C}"/>
+                  <a16:creationId xmlns:a16="http://schemas.microsoft.com/office/drawing/2014/main" id="{41B8B751-8FAA-0E5C-4367-CDA9D0E9F923}"/>
                 </a:ext>
               </a:extLst>
             </p:cNvPr>
-            <p:cNvSpPr txBox="1"/>
+            <p:cNvPicPr>
+              <a:picLocks noChangeAspect="1" noChangeArrowheads="1"/>
+            </p:cNvPicPr>
             <p:nvPr/>
-          </p:nvSpPr>
-          <p:spPr>
+          </p:nvPicPr>
+          <p:blipFill rotWithShape="1">
+            <a:blip r:embed="rId13">
+              <a:extLst>
+                <a:ext uri="{28A0092B-C50C-407E-A947-70E740481C1C}">
+                  <a14:useLocalDpi xmlns:a14="http://schemas.microsoft.com/office/drawing/2010/main" val="0"/>
+                </a:ext>
+              </a:extLst>
+            </a:blip>
+            <a:srcRect l="12316" t="23509" r="25407" b="18397"/>
+            <a:stretch/>
+          </p:blipFill>
+          <p:spPr bwMode="auto">
             <a:xfrm>
-              <a:off x="271130" y="-22860"/>
-              <a:ext cx="1020472" cy="369332"/>
+              <a:off x="12243033" y="1134767"/>
+              <a:ext cx="362955" cy="338577"/>
             </a:xfrm>
             <a:prstGeom prst="rect">
               <a:avLst/>
             </a:prstGeom>
             <a:noFill/>
+            <a:extLst>
+              <a:ext uri="{909E8E84-426E-40DD-AFC4-6F175D3DCCD1}">
+                <a14:hiddenFill xmlns:a14="http://schemas.microsoft.com/office/drawing/2010/main">
+                  <a:solidFill>
+                    <a:srgbClr val="FFFFFF"/>
+                  </a:solidFill>
+                </a14:hiddenFill>
+              </a:ext>
+            </a:extLst>
           </p:spPr>
-          <p:txBody>
-            <a:bodyPr wrap="none" rtlCol="0">
-              <a:spAutoFit/>
-            </a:bodyPr>
-            <a:lstStyle/>
-            <a:p>
-              <a:r>
-                <a:rPr lang="en-DE" b="1" dirty="0">
-                  <a:latin typeface="Avenir Book" panose="02000503020000020003" pitchFamily="2" charset="0"/>
-                </a:rPr>
-                <a:t>Sources</a:t>
-              </a:r>
-            </a:p>
-          </p:txBody>
-        </p:sp>
-        <p:sp>
-          <p:nvSpPr>
-            <p:cNvPr id="1045" name="TextBox 1044">
+        </p:pic>
+        <p:pic>
+          <p:nvPicPr>
+            <p:cNvPr id="114" name="Picture 8" descr="10 Reasons Why Neo4j Is the Best Graph Database for Your Project">
               <a:extLst>
                 <a:ext uri="{FF2B5EF4-FFF2-40B4-BE49-F238E27FC236}">
-                  <a16:creationId xmlns:a16="http://schemas.microsoft.com/office/drawing/2014/main" id="{0B6AEE62-9398-A9C2-6A6F-787002061049}"/>
+                  <a16:creationId xmlns:a16="http://schemas.microsoft.com/office/drawing/2014/main" id="{EADF39D3-47B9-378A-114F-35AD602931B4}"/>
                 </a:ext>
               </a:extLst>
             </p:cNvPr>
-            <p:cNvSpPr txBox="1"/>
+            <p:cNvPicPr>
+              <a:picLocks noChangeAspect="1" noChangeArrowheads="1"/>
+            </p:cNvPicPr>
             <p:nvPr/>
-          </p:nvSpPr>
-          <p:spPr>
+          </p:nvPicPr>
+          <p:blipFill rotWithShape="1">
+            <a:blip r:embed="rId13">
+              <a:extLst>
+                <a:ext uri="{28A0092B-C50C-407E-A947-70E740481C1C}">
+                  <a14:useLocalDpi xmlns:a14="http://schemas.microsoft.com/office/drawing/2010/main" val="0"/>
+                </a:ext>
+              </a:extLst>
+            </a:blip>
+            <a:srcRect l="12316" t="23509" r="25407" b="18397"/>
+            <a:stretch/>
+          </p:blipFill>
+          <p:spPr bwMode="auto">
             <a:xfrm>
-              <a:off x="10977562" y="-22860"/>
-              <a:ext cx="728084" cy="369332"/>
+              <a:off x="12243033" y="2521893"/>
+              <a:ext cx="362955" cy="338577"/>
             </a:xfrm>
             <a:prstGeom prst="rect">
               <a:avLst/>
             </a:prstGeom>
             <a:noFill/>
+            <a:extLst>
+              <a:ext uri="{909E8E84-426E-40DD-AFC4-6F175D3DCCD1}">
+                <a14:hiddenFill xmlns:a14="http://schemas.microsoft.com/office/drawing/2010/main">
+                  <a:solidFill>
+                    <a:srgbClr val="FFFFFF"/>
+                  </a:solidFill>
+                </a14:hiddenFill>
+              </a:ext>
+            </a:extLst>
           </p:spPr>
-          <p:txBody>
-            <a:bodyPr wrap="none" rtlCol="0">
-              <a:spAutoFit/>
-            </a:bodyPr>
-            <a:lstStyle/>
-            <a:p>
-              <a:pPr algn="ctr"/>
-              <a:r>
-                <a:rPr lang="en-DE" b="1" dirty="0">
-                  <a:latin typeface="Avenir Book" panose="02000503020000020003" pitchFamily="2" charset="0"/>
-                </a:rPr>
-                <a:t>Sinks</a:t>
-              </a:r>
-            </a:p>
-          </p:txBody>
-        </p:sp>
+        </p:pic>
+        <p:pic>
+          <p:nvPicPr>
+            <p:cNvPr id="167" name="Picture 8" descr="10 Reasons Why Neo4j Is the Best Graph Database for Your Project">
+              <a:extLst>
+                <a:ext uri="{FF2B5EF4-FFF2-40B4-BE49-F238E27FC236}">
+                  <a16:creationId xmlns:a16="http://schemas.microsoft.com/office/drawing/2014/main" id="{B9012729-DBAF-52AD-03A1-0DC68F1913C9}"/>
+                </a:ext>
+              </a:extLst>
+            </p:cNvPr>
+            <p:cNvPicPr>
+              <a:picLocks noChangeAspect="1" noChangeArrowheads="1"/>
+            </p:cNvPicPr>
+            <p:nvPr/>
+          </p:nvPicPr>
+          <p:blipFill rotWithShape="1">
+            <a:blip r:embed="rId13">
+              <a:extLst>
+                <a:ext uri="{28A0092B-C50C-407E-A947-70E740481C1C}">
+                  <a14:useLocalDpi xmlns:a14="http://schemas.microsoft.com/office/drawing/2010/main" val="0"/>
+                </a:ext>
+              </a:extLst>
+            </a:blip>
+            <a:srcRect l="12316" t="23509" r="25407" b="18397"/>
+            <a:stretch/>
+          </p:blipFill>
+          <p:spPr bwMode="auto">
+            <a:xfrm>
+              <a:off x="12243033" y="3903880"/>
+              <a:ext cx="362955" cy="338577"/>
+            </a:xfrm>
+            <a:prstGeom prst="rect">
+              <a:avLst/>
+            </a:prstGeom>
+            <a:noFill/>
+            <a:extLst>
+              <a:ext uri="{909E8E84-426E-40DD-AFC4-6F175D3DCCD1}">
+                <a14:hiddenFill xmlns:a14="http://schemas.microsoft.com/office/drawing/2010/main">
+                  <a:solidFill>
+                    <a:srgbClr val="FFFFFF"/>
+                  </a:solidFill>
+                </a14:hiddenFill>
+              </a:ext>
+            </a:extLst>
+          </p:spPr>
+        </p:pic>
       </p:grpSp>
     </p:spTree>
     <p:extLst>
       <p:ext uri="{BB962C8B-B14F-4D97-AF65-F5344CB8AC3E}">
-        <p14:creationId xmlns:p14="http://schemas.microsoft.com/office/powerpoint/2010/main" val="7153465"/>
+        <p14:creationId xmlns:p14="http://schemas.microsoft.com/office/powerpoint/2010/main" val="1649250566"/>
       </p:ext>
     </p:extLst>
   </p:cSld>

</xml_diff>